<commit_message>
Update intro ggplot slides
</commit_message>
<xml_diff>
--- a/presentation/images/images_powerpoint.pptx
+++ b/presentation/images/images_powerpoint.pptx
@@ -104,6 +104,11 @@
       </a:defRPr>
     </a:lvl9pPr>
   </p:defaultTextStyle>
+  <p:extLst>
+    <p:ext uri="{EFAFB233-063F-42B5-8137-9DF3F51BA10A}">
+      <p15:sldGuideLst xmlns:p15="http://schemas.microsoft.com/office/powerpoint/2012/main"/>
+    </p:ext>
+  </p:extLst>
 </p:presentation>
 </file>
 
@@ -254,7 +259,7 @@
           <a:p>
             <a:fld id="{C49EFF57-3444-4D3C-901B-15A513E1D5E0}" type="datetimeFigureOut">
               <a:rPr lang="en-US" smtClean="0"/>
-              <a:t>7/11/2021</a:t>
+              <a:t>7/12/2021</a:t>
             </a:fld>
             <a:endParaRPr lang="en-US"/>
           </a:p>
@@ -452,7 +457,7 @@
           <a:p>
             <a:fld id="{C49EFF57-3444-4D3C-901B-15A513E1D5E0}" type="datetimeFigureOut">
               <a:rPr lang="en-US" smtClean="0"/>
-              <a:t>7/11/2021</a:t>
+              <a:t>7/12/2021</a:t>
             </a:fld>
             <a:endParaRPr lang="en-US"/>
           </a:p>
@@ -660,7 +665,7 @@
           <a:p>
             <a:fld id="{C49EFF57-3444-4D3C-901B-15A513E1D5E0}" type="datetimeFigureOut">
               <a:rPr lang="en-US" smtClean="0"/>
-              <a:t>7/11/2021</a:t>
+              <a:t>7/12/2021</a:t>
             </a:fld>
             <a:endParaRPr lang="en-US"/>
           </a:p>
@@ -858,7 +863,7 @@
           <a:p>
             <a:fld id="{C49EFF57-3444-4D3C-901B-15A513E1D5E0}" type="datetimeFigureOut">
               <a:rPr lang="en-US" smtClean="0"/>
-              <a:t>7/11/2021</a:t>
+              <a:t>7/12/2021</a:t>
             </a:fld>
             <a:endParaRPr lang="en-US"/>
           </a:p>
@@ -1133,7 +1138,7 @@
           <a:p>
             <a:fld id="{C49EFF57-3444-4D3C-901B-15A513E1D5E0}" type="datetimeFigureOut">
               <a:rPr lang="en-US" smtClean="0"/>
-              <a:t>7/11/2021</a:t>
+              <a:t>7/12/2021</a:t>
             </a:fld>
             <a:endParaRPr lang="en-US"/>
           </a:p>
@@ -1398,7 +1403,7 @@
           <a:p>
             <a:fld id="{C49EFF57-3444-4D3C-901B-15A513E1D5E0}" type="datetimeFigureOut">
               <a:rPr lang="en-US" smtClean="0"/>
-              <a:t>7/11/2021</a:t>
+              <a:t>7/12/2021</a:t>
             </a:fld>
             <a:endParaRPr lang="en-US"/>
           </a:p>
@@ -1810,7 +1815,7 @@
           <a:p>
             <a:fld id="{C49EFF57-3444-4D3C-901B-15A513E1D5E0}" type="datetimeFigureOut">
               <a:rPr lang="en-US" smtClean="0"/>
-              <a:t>7/11/2021</a:t>
+              <a:t>7/12/2021</a:t>
             </a:fld>
             <a:endParaRPr lang="en-US"/>
           </a:p>
@@ -1951,7 +1956,7 @@
           <a:p>
             <a:fld id="{C49EFF57-3444-4D3C-901B-15A513E1D5E0}" type="datetimeFigureOut">
               <a:rPr lang="en-US" smtClean="0"/>
-              <a:t>7/11/2021</a:t>
+              <a:t>7/12/2021</a:t>
             </a:fld>
             <a:endParaRPr lang="en-US"/>
           </a:p>
@@ -2064,7 +2069,7 @@
           <a:p>
             <a:fld id="{C49EFF57-3444-4D3C-901B-15A513E1D5E0}" type="datetimeFigureOut">
               <a:rPr lang="en-US" smtClean="0"/>
-              <a:t>7/11/2021</a:t>
+              <a:t>7/12/2021</a:t>
             </a:fld>
             <a:endParaRPr lang="en-US"/>
           </a:p>
@@ -2375,7 +2380,7 @@
           <a:p>
             <a:fld id="{C49EFF57-3444-4D3C-901B-15A513E1D5E0}" type="datetimeFigureOut">
               <a:rPr lang="en-US" smtClean="0"/>
-              <a:t>7/11/2021</a:t>
+              <a:t>7/12/2021</a:t>
             </a:fld>
             <a:endParaRPr lang="en-US"/>
           </a:p>
@@ -2663,7 +2668,7 @@
           <a:p>
             <a:fld id="{C49EFF57-3444-4D3C-901B-15A513E1D5E0}" type="datetimeFigureOut">
               <a:rPr lang="en-US" smtClean="0"/>
-              <a:t>7/11/2021</a:t>
+              <a:t>7/12/2021</a:t>
             </a:fld>
             <a:endParaRPr lang="en-US"/>
           </a:p>
@@ -2904,7 +2909,7 @@
           <a:p>
             <a:fld id="{C49EFF57-3444-4D3C-901B-15A513E1D5E0}" type="datetimeFigureOut">
               <a:rPr lang="en-US" smtClean="0"/>
-              <a:t>7/11/2021</a:t>
+              <a:t>7/12/2021</a:t>
             </a:fld>
             <a:endParaRPr lang="en-US"/>
           </a:p>
@@ -3323,10 +3328,10 @@
       </p:grpSpPr>
       <p:grpSp>
         <p:nvGrpSpPr>
-          <p:cNvPr id="22" name="Group 21">
-            <a:extLst>
-              <a:ext uri="{FF2B5EF4-FFF2-40B4-BE49-F238E27FC236}">
-                <a16:creationId xmlns:a16="http://schemas.microsoft.com/office/drawing/2014/main" id="{E76B3620-0EB4-412C-9996-8C138AE9B931}"/>
+          <p:cNvPr id="12" name="Group 11">
+            <a:extLst>
+              <a:ext uri="{FF2B5EF4-FFF2-40B4-BE49-F238E27FC236}">
+                <a16:creationId xmlns:a16="http://schemas.microsoft.com/office/drawing/2014/main" id="{8FD51DEE-164F-48F3-85C4-B9A91E0104BB}"/>
               </a:ext>
             </a:extLst>
           </p:cNvPr>
@@ -3335,18 +3340,18 @@
         </p:nvGrpSpPr>
         <p:grpSpPr>
           <a:xfrm>
-            <a:off x="553002" y="658237"/>
-            <a:ext cx="10295973" cy="5571978"/>
-            <a:chOff x="553002" y="658237"/>
-            <a:chExt cx="10295973" cy="5571978"/>
+            <a:off x="591021" y="765100"/>
+            <a:ext cx="10257954" cy="4464610"/>
+            <a:chOff x="591021" y="765100"/>
+            <a:chExt cx="10257954" cy="4464610"/>
           </a:xfrm>
         </p:grpSpPr>
         <p:grpSp>
           <p:nvGrpSpPr>
-            <p:cNvPr id="15" name="Group 14">
+            <p:cNvPr id="3" name="Group 2">
               <a:extLst>
                 <a:ext uri="{FF2B5EF4-FFF2-40B4-BE49-F238E27FC236}">
-                  <a16:creationId xmlns:a16="http://schemas.microsoft.com/office/drawing/2014/main" id="{B3B5DEB4-47A5-4C1A-9833-BD701DF26D6F}"/>
+                  <a16:creationId xmlns:a16="http://schemas.microsoft.com/office/drawing/2014/main" id="{D37A8DF6-170F-4956-B940-2DD5AECE024B}"/>
                 </a:ext>
               </a:extLst>
             </p:cNvPr>
@@ -3355,512 +3360,719 @@
           </p:nvGrpSpPr>
           <p:grpSpPr>
             <a:xfrm>
-              <a:off x="1096010" y="2681605"/>
-              <a:ext cx="9752965" cy="934720"/>
-              <a:chOff x="924560" y="2367280"/>
-              <a:chExt cx="9752965" cy="934720"/>
+              <a:off x="591021" y="765100"/>
+              <a:ext cx="10257954" cy="4464610"/>
+              <a:chOff x="591021" y="765100"/>
+              <a:chExt cx="10257954" cy="4464610"/>
             </a:xfrm>
           </p:grpSpPr>
-          <p:sp>
-            <p:nvSpPr>
-              <p:cNvPr id="4" name="Rectangle: Rounded Corners 3">
+          <p:grpSp>
+            <p:nvGrpSpPr>
+              <p:cNvPr id="22" name="Group 21">
                 <a:extLst>
                   <a:ext uri="{FF2B5EF4-FFF2-40B4-BE49-F238E27FC236}">
-                    <a16:creationId xmlns:a16="http://schemas.microsoft.com/office/drawing/2014/main" id="{E2548BEB-AED9-4D45-B1D4-5EB5D49EAFF2}"/>
+                    <a16:creationId xmlns:a16="http://schemas.microsoft.com/office/drawing/2014/main" id="{E76B3620-0EB4-412C-9996-8C138AE9B931}"/>
                   </a:ext>
                 </a:extLst>
               </p:cNvPr>
-              <p:cNvSpPr/>
+              <p:cNvGrpSpPr/>
+              <p:nvPr/>
+            </p:nvGrpSpPr>
+            <p:grpSpPr>
+              <a:xfrm>
+                <a:off x="591021" y="1432420"/>
+                <a:ext cx="10257954" cy="3797290"/>
+                <a:chOff x="591021" y="1432420"/>
+                <a:chExt cx="10257954" cy="3797290"/>
+              </a:xfrm>
+            </p:grpSpPr>
+            <p:grpSp>
+              <p:nvGrpSpPr>
+                <p:cNvPr id="15" name="Group 14">
+                  <a:extLst>
+                    <a:ext uri="{FF2B5EF4-FFF2-40B4-BE49-F238E27FC236}">
+                      <a16:creationId xmlns:a16="http://schemas.microsoft.com/office/drawing/2014/main" id="{B3B5DEB4-47A5-4C1A-9833-BD701DF26D6F}"/>
+                    </a:ext>
+                  </a:extLst>
+                </p:cNvPr>
+                <p:cNvGrpSpPr/>
+                <p:nvPr/>
+              </p:nvGrpSpPr>
+              <p:grpSpPr>
+                <a:xfrm>
+                  <a:off x="1096010" y="2681605"/>
+                  <a:ext cx="9752965" cy="934720"/>
+                  <a:chOff x="924560" y="2367280"/>
+                  <a:chExt cx="9752965" cy="934720"/>
+                </a:xfrm>
+              </p:grpSpPr>
+              <p:sp>
+                <p:nvSpPr>
+                  <p:cNvPr id="4" name="Rectangle: Rounded Corners 3">
+                    <a:extLst>
+                      <a:ext uri="{FF2B5EF4-FFF2-40B4-BE49-F238E27FC236}">
+                        <a16:creationId xmlns:a16="http://schemas.microsoft.com/office/drawing/2014/main" id="{E2548BEB-AED9-4D45-B1D4-5EB5D49EAFF2}"/>
+                      </a:ext>
+                    </a:extLst>
+                  </p:cNvPr>
+                  <p:cNvSpPr/>
+                  <p:nvPr/>
+                </p:nvSpPr>
+                <p:spPr>
+                  <a:xfrm>
+                    <a:off x="924560" y="2367280"/>
+                    <a:ext cx="1751965" cy="934720"/>
+                  </a:xfrm>
+                  <a:prstGeom prst="roundRect">
+                    <a:avLst/>
+                  </a:prstGeom>
+                  <a:solidFill>
+                    <a:schemeClr val="accent6"/>
+                  </a:solidFill>
+                  <a:ln>
+                    <a:solidFill>
+                      <a:schemeClr val="tx1"/>
+                    </a:solidFill>
+                  </a:ln>
+                </p:spPr>
+                <p:style>
+                  <a:lnRef idx="2">
+                    <a:schemeClr val="accent1">
+                      <a:shade val="50000"/>
+                    </a:schemeClr>
+                  </a:lnRef>
+                  <a:fillRef idx="1">
+                    <a:schemeClr val="accent1"/>
+                  </a:fillRef>
+                  <a:effectRef idx="0">
+                    <a:schemeClr val="accent1"/>
+                  </a:effectRef>
+                  <a:fontRef idx="minor">
+                    <a:schemeClr val="lt1"/>
+                  </a:fontRef>
+                </p:style>
+                <p:txBody>
+                  <a:bodyPr rtlCol="0" anchor="ctr"/>
+                  <a:lstStyle/>
+                  <a:p>
+                    <a:pPr algn="ctr"/>
+                    <a:r>
+                      <a:rPr lang="en-US" dirty="0"/>
+                      <a:t>Explain</a:t>
+                    </a:r>
+                  </a:p>
+                </p:txBody>
+              </p:sp>
+              <p:sp>
+                <p:nvSpPr>
+                  <p:cNvPr id="5" name="Rectangle: Rounded Corners 4">
+                    <a:extLst>
+                      <a:ext uri="{FF2B5EF4-FFF2-40B4-BE49-F238E27FC236}">
+                        <a16:creationId xmlns:a16="http://schemas.microsoft.com/office/drawing/2014/main" id="{6AFB17C0-1F78-4254-93EC-31A9DB3CA2E6}"/>
+                      </a:ext>
+                    </a:extLst>
+                  </p:cNvPr>
+                  <p:cNvSpPr/>
+                  <p:nvPr/>
+                </p:nvSpPr>
+                <p:spPr>
+                  <a:xfrm>
+                    <a:off x="3429635" y="2367280"/>
+                    <a:ext cx="1751965" cy="934720"/>
+                  </a:xfrm>
+                  <a:prstGeom prst="roundRect">
+                    <a:avLst/>
+                  </a:prstGeom>
+                  <a:solidFill>
+                    <a:schemeClr val="accent2"/>
+                  </a:solidFill>
+                  <a:ln>
+                    <a:solidFill>
+                      <a:schemeClr val="tx1"/>
+                    </a:solidFill>
+                  </a:ln>
+                </p:spPr>
+                <p:style>
+                  <a:lnRef idx="2">
+                    <a:schemeClr val="accent1">
+                      <a:shade val="50000"/>
+                    </a:schemeClr>
+                  </a:lnRef>
+                  <a:fillRef idx="1">
+                    <a:schemeClr val="accent1"/>
+                  </a:fillRef>
+                  <a:effectRef idx="0">
+                    <a:schemeClr val="accent1"/>
+                  </a:effectRef>
+                  <a:fontRef idx="minor">
+                    <a:schemeClr val="lt1"/>
+                  </a:fontRef>
+                </p:style>
+                <p:txBody>
+                  <a:bodyPr rtlCol="0" anchor="ctr"/>
+                  <a:lstStyle/>
+                  <a:p>
+                    <a:pPr algn="ctr"/>
+                    <a:r>
+                      <a:rPr lang="en-US" dirty="0"/>
+                      <a:t>Demonstrate</a:t>
+                    </a:r>
+                  </a:p>
+                </p:txBody>
+              </p:sp>
+              <p:sp>
+                <p:nvSpPr>
+                  <p:cNvPr id="6" name="Rectangle: Rounded Corners 5">
+                    <a:extLst>
+                      <a:ext uri="{FF2B5EF4-FFF2-40B4-BE49-F238E27FC236}">
+                        <a16:creationId xmlns:a16="http://schemas.microsoft.com/office/drawing/2014/main" id="{DEABF215-C694-42D8-B2C2-E9AB732883B8}"/>
+                      </a:ext>
+                    </a:extLst>
+                  </p:cNvPr>
+                  <p:cNvSpPr/>
+                  <p:nvPr/>
+                </p:nvSpPr>
+                <p:spPr>
+                  <a:xfrm>
+                    <a:off x="6134419" y="2367280"/>
+                    <a:ext cx="1751965" cy="934720"/>
+                  </a:xfrm>
+                  <a:prstGeom prst="roundRect">
+                    <a:avLst/>
+                  </a:prstGeom>
+                  <a:solidFill>
+                    <a:srgbClr val="00B0F0"/>
+                  </a:solidFill>
+                  <a:ln>
+                    <a:solidFill>
+                      <a:schemeClr val="tx1"/>
+                    </a:solidFill>
+                  </a:ln>
+                </p:spPr>
+                <p:style>
+                  <a:lnRef idx="2">
+                    <a:schemeClr val="accent1">
+                      <a:shade val="50000"/>
+                    </a:schemeClr>
+                  </a:lnRef>
+                  <a:fillRef idx="1">
+                    <a:schemeClr val="accent1"/>
+                  </a:fillRef>
+                  <a:effectRef idx="0">
+                    <a:schemeClr val="accent1"/>
+                  </a:effectRef>
+                  <a:fontRef idx="minor">
+                    <a:schemeClr val="lt1"/>
+                  </a:fontRef>
+                </p:style>
+                <p:txBody>
+                  <a:bodyPr rtlCol="0" anchor="ctr"/>
+                  <a:lstStyle/>
+                  <a:p>
+                    <a:pPr algn="ctr"/>
+                    <a:r>
+                      <a:rPr lang="en-US" dirty="0"/>
+                      <a:t>Guide</a:t>
+                    </a:r>
+                  </a:p>
+                </p:txBody>
+              </p:sp>
+              <p:sp>
+                <p:nvSpPr>
+                  <p:cNvPr id="7" name="Rectangle: Rounded Corners 6">
+                    <a:extLst>
+                      <a:ext uri="{FF2B5EF4-FFF2-40B4-BE49-F238E27FC236}">
+                        <a16:creationId xmlns:a16="http://schemas.microsoft.com/office/drawing/2014/main" id="{4D9AB747-04E9-4577-88C4-25036C4D7660}"/>
+                      </a:ext>
+                    </a:extLst>
+                  </p:cNvPr>
+                  <p:cNvSpPr/>
+                  <p:nvPr/>
+                </p:nvSpPr>
+                <p:spPr>
+                  <a:xfrm>
+                    <a:off x="8925560" y="2367280"/>
+                    <a:ext cx="1751965" cy="934720"/>
+                  </a:xfrm>
+                  <a:prstGeom prst="roundRect">
+                    <a:avLst/>
+                  </a:prstGeom>
+                  <a:ln>
+                    <a:solidFill>
+                      <a:schemeClr val="tx1"/>
+                    </a:solidFill>
+                  </a:ln>
+                </p:spPr>
+                <p:style>
+                  <a:lnRef idx="2">
+                    <a:schemeClr val="accent1">
+                      <a:shade val="50000"/>
+                    </a:schemeClr>
+                  </a:lnRef>
+                  <a:fillRef idx="1">
+                    <a:schemeClr val="accent1"/>
+                  </a:fillRef>
+                  <a:effectRef idx="0">
+                    <a:schemeClr val="accent1"/>
+                  </a:effectRef>
+                  <a:fontRef idx="minor">
+                    <a:schemeClr val="lt1"/>
+                  </a:fontRef>
+                </p:style>
+                <p:txBody>
+                  <a:bodyPr rtlCol="0" anchor="ctr"/>
+                  <a:lstStyle/>
+                  <a:p>
+                    <a:pPr algn="ctr"/>
+                    <a:r>
+                      <a:rPr lang="en-US" dirty="0"/>
+                      <a:t>Evaluate</a:t>
+                    </a:r>
+                  </a:p>
+                </p:txBody>
+              </p:sp>
+              <p:sp>
+                <p:nvSpPr>
+                  <p:cNvPr id="8" name="Arrow: Right 7">
+                    <a:extLst>
+                      <a:ext uri="{FF2B5EF4-FFF2-40B4-BE49-F238E27FC236}">
+                        <a16:creationId xmlns:a16="http://schemas.microsoft.com/office/drawing/2014/main" id="{D6528606-6C1C-4247-B1C4-8963009ECFF9}"/>
+                      </a:ext>
+                    </a:extLst>
+                  </p:cNvPr>
+                  <p:cNvSpPr/>
+                  <p:nvPr/>
+                </p:nvSpPr>
+                <p:spPr>
+                  <a:xfrm>
+                    <a:off x="2876550" y="2705100"/>
+                    <a:ext cx="381000" cy="314325"/>
+                  </a:xfrm>
+                  <a:prstGeom prst="rightArrow">
+                    <a:avLst/>
+                  </a:prstGeom>
+                  <a:solidFill>
+                    <a:schemeClr val="tx1"/>
+                  </a:solidFill>
+                  <a:ln>
+                    <a:solidFill>
+                      <a:schemeClr val="tx1"/>
+                    </a:solidFill>
+                  </a:ln>
+                </p:spPr>
+                <p:style>
+                  <a:lnRef idx="2">
+                    <a:schemeClr val="accent1">
+                      <a:shade val="50000"/>
+                    </a:schemeClr>
+                  </a:lnRef>
+                  <a:fillRef idx="1">
+                    <a:schemeClr val="accent1"/>
+                  </a:fillRef>
+                  <a:effectRef idx="0">
+                    <a:schemeClr val="accent1"/>
+                  </a:effectRef>
+                  <a:fontRef idx="minor">
+                    <a:schemeClr val="lt1"/>
+                  </a:fontRef>
+                </p:style>
+                <p:txBody>
+                  <a:bodyPr rtlCol="0" anchor="ctr"/>
+                  <a:lstStyle/>
+                  <a:p>
+                    <a:pPr algn="ctr"/>
+                    <a:endParaRPr lang="en-US"/>
+                  </a:p>
+                </p:txBody>
+              </p:sp>
+              <p:sp>
+                <p:nvSpPr>
+                  <p:cNvPr id="9" name="Arrow: Right 8">
+                    <a:extLst>
+                      <a:ext uri="{FF2B5EF4-FFF2-40B4-BE49-F238E27FC236}">
+                        <a16:creationId xmlns:a16="http://schemas.microsoft.com/office/drawing/2014/main" id="{FD19A871-AF91-4802-940D-7607D1BBD111}"/>
+                      </a:ext>
+                    </a:extLst>
+                  </p:cNvPr>
+                  <p:cNvSpPr/>
+                  <p:nvPr/>
+                </p:nvSpPr>
+                <p:spPr>
+                  <a:xfrm>
+                    <a:off x="5429727" y="2677477"/>
+                    <a:ext cx="381000" cy="314325"/>
+                  </a:xfrm>
+                  <a:prstGeom prst="rightArrow">
+                    <a:avLst/>
+                  </a:prstGeom>
+                  <a:solidFill>
+                    <a:schemeClr val="tx1"/>
+                  </a:solidFill>
+                  <a:ln>
+                    <a:solidFill>
+                      <a:schemeClr val="tx1"/>
+                    </a:solidFill>
+                  </a:ln>
+                </p:spPr>
+                <p:style>
+                  <a:lnRef idx="2">
+                    <a:schemeClr val="accent1">
+                      <a:shade val="50000"/>
+                    </a:schemeClr>
+                  </a:lnRef>
+                  <a:fillRef idx="1">
+                    <a:schemeClr val="accent1"/>
+                  </a:fillRef>
+                  <a:effectRef idx="0">
+                    <a:schemeClr val="accent1"/>
+                  </a:effectRef>
+                  <a:fontRef idx="minor">
+                    <a:schemeClr val="lt1"/>
+                  </a:fontRef>
+                </p:style>
+                <p:txBody>
+                  <a:bodyPr rtlCol="0" anchor="ctr"/>
+                  <a:lstStyle/>
+                  <a:p>
+                    <a:pPr algn="ctr"/>
+                    <a:endParaRPr lang="en-US"/>
+                  </a:p>
+                </p:txBody>
+              </p:sp>
+              <p:sp>
+                <p:nvSpPr>
+                  <p:cNvPr id="10" name="Arrow: Right 9">
+                    <a:extLst>
+                      <a:ext uri="{FF2B5EF4-FFF2-40B4-BE49-F238E27FC236}">
+                        <a16:creationId xmlns:a16="http://schemas.microsoft.com/office/drawing/2014/main" id="{17E43123-59C0-41BB-B908-03A2351DF7FE}"/>
+                      </a:ext>
+                    </a:extLst>
+                  </p:cNvPr>
+                  <p:cNvSpPr/>
+                  <p:nvPr/>
+                </p:nvSpPr>
+                <p:spPr>
+                  <a:xfrm>
+                    <a:off x="8210076" y="2677476"/>
+                    <a:ext cx="381000" cy="314325"/>
+                  </a:xfrm>
+                  <a:prstGeom prst="rightArrow">
+                    <a:avLst/>
+                  </a:prstGeom>
+                  <a:solidFill>
+                    <a:schemeClr val="tx1"/>
+                  </a:solidFill>
+                  <a:ln>
+                    <a:solidFill>
+                      <a:schemeClr val="tx1"/>
+                    </a:solidFill>
+                  </a:ln>
+                </p:spPr>
+                <p:style>
+                  <a:lnRef idx="2">
+                    <a:schemeClr val="accent1">
+                      <a:shade val="50000"/>
+                    </a:schemeClr>
+                  </a:lnRef>
+                  <a:fillRef idx="1">
+                    <a:schemeClr val="accent1"/>
+                  </a:fillRef>
+                  <a:effectRef idx="0">
+                    <a:schemeClr val="accent1"/>
+                  </a:effectRef>
+                  <a:fontRef idx="minor">
+                    <a:schemeClr val="lt1"/>
+                  </a:fontRef>
+                </p:style>
+                <p:txBody>
+                  <a:bodyPr rtlCol="0" anchor="ctr"/>
+                  <a:lstStyle/>
+                  <a:p>
+                    <a:pPr algn="ctr"/>
+                    <a:endParaRPr lang="en-US"/>
+                  </a:p>
+                </p:txBody>
+              </p:sp>
+            </p:grpSp>
+            <p:pic>
+              <p:nvPicPr>
+                <p:cNvPr id="14" name="Picture 13" descr="Teacher pointing at laptop screen to young students">
+                  <a:extLst>
+                    <a:ext uri="{FF2B5EF4-FFF2-40B4-BE49-F238E27FC236}">
+                      <a16:creationId xmlns:a16="http://schemas.microsoft.com/office/drawing/2014/main" id="{F9902EE4-E924-4C83-B663-5B19A6466995}"/>
+                    </a:ext>
+                  </a:extLst>
+                </p:cNvPr>
+                <p:cNvPicPr>
+                  <a:picLocks noChangeAspect="1"/>
+                </p:cNvPicPr>
+                <p:nvPr/>
+              </p:nvPicPr>
+              <p:blipFill>
+                <a:blip r:embed="rId2">
+                  <a:extLst>
+                    <a:ext uri="{28A0092B-C50C-407E-A947-70E740481C1C}">
+                      <a14:useLocalDpi xmlns:a14="http://schemas.microsoft.com/office/drawing/2010/main" val="0"/>
+                    </a:ext>
+                  </a:extLst>
+                </a:blip>
+                <a:stretch>
+                  <a:fillRect/>
+                </a:stretch>
+              </p:blipFill>
+              <p:spPr>
+                <a:xfrm>
+                  <a:off x="6390414" y="1432420"/>
+                  <a:ext cx="1582873" cy="1054992"/>
+                </a:xfrm>
+                <a:prstGeom prst="rect">
+                  <a:avLst/>
+                </a:prstGeom>
+                <a:ln>
+                  <a:solidFill>
+                    <a:schemeClr val="tx1"/>
+                  </a:solidFill>
+                </a:ln>
+                <a:effectLst>
+                  <a:outerShdw blurRad="292100" dist="139700" dir="2700000" algn="tl" rotWithShape="0">
+                    <a:srgbClr val="333333">
+                      <a:alpha val="65000"/>
+                    </a:srgbClr>
+                  </a:outerShdw>
+                </a:effectLst>
+              </p:spPr>
+            </p:pic>
+            <p:pic>
+              <p:nvPicPr>
+                <p:cNvPr id="17" name="Picture 16" descr="Graphical user interface&#10;&#10;Description automatically generated">
+                  <a:extLst>
+                    <a:ext uri="{FF2B5EF4-FFF2-40B4-BE49-F238E27FC236}">
+                      <a16:creationId xmlns:a16="http://schemas.microsoft.com/office/drawing/2014/main" id="{49BC7F51-6CF5-4964-9794-E25F46339A1F}"/>
+                    </a:ext>
+                  </a:extLst>
+                </p:cNvPr>
+                <p:cNvPicPr>
+                  <a:picLocks noChangeAspect="1"/>
+                </p:cNvPicPr>
+                <p:nvPr/>
+              </p:nvPicPr>
+              <p:blipFill>
+                <a:blip r:embed="rId3">
+                  <a:extLst>
+                    <a:ext uri="{28A0092B-C50C-407E-A947-70E740481C1C}">
+                      <a14:useLocalDpi xmlns:a14="http://schemas.microsoft.com/office/drawing/2010/main" val="0"/>
+                    </a:ext>
+                  </a:extLst>
+                </a:blip>
+                <a:stretch>
+                  <a:fillRect/>
+                </a:stretch>
+              </p:blipFill>
+              <p:spPr>
+                <a:xfrm>
+                  <a:off x="3124675" y="3920262"/>
+                  <a:ext cx="2704784" cy="1309448"/>
+                </a:xfrm>
+                <a:prstGeom prst="rect">
+                  <a:avLst/>
+                </a:prstGeom>
+                <a:ln>
+                  <a:solidFill>
+                    <a:schemeClr val="tx1"/>
+                  </a:solidFill>
+                </a:ln>
+                <a:effectLst>
+                  <a:outerShdw blurRad="292100" dist="139700" dir="2700000" algn="tl" rotWithShape="0">
+                    <a:srgbClr val="333333">
+                      <a:alpha val="65000"/>
+                    </a:srgbClr>
+                  </a:outerShdw>
+                </a:effectLst>
+              </p:spPr>
+            </p:pic>
+            <p:pic>
+              <p:nvPicPr>
+                <p:cNvPr id="19" name="Picture 18" descr="A picture containing text&#10;&#10;Description automatically generated">
+                  <a:extLst>
+                    <a:ext uri="{FF2B5EF4-FFF2-40B4-BE49-F238E27FC236}">
+                      <a16:creationId xmlns:a16="http://schemas.microsoft.com/office/drawing/2014/main" id="{1E7A230C-C80A-4652-8B8E-0235E37F4572}"/>
+                    </a:ext>
+                  </a:extLst>
+                </p:cNvPr>
+                <p:cNvPicPr>
+                  <a:picLocks noChangeAspect="1"/>
+                </p:cNvPicPr>
+                <p:nvPr/>
+              </p:nvPicPr>
+              <p:blipFill>
+                <a:blip r:embed="rId4">
+                  <a:extLst>
+                    <a:ext uri="{28A0092B-C50C-407E-A947-70E740481C1C}">
+                      <a14:useLocalDpi xmlns:a14="http://schemas.microsoft.com/office/drawing/2010/main" val="0"/>
+                    </a:ext>
+                  </a:extLst>
+                </a:blip>
+                <a:stretch>
+                  <a:fillRect/>
+                </a:stretch>
+              </p:blipFill>
+              <p:spPr>
+                <a:xfrm>
+                  <a:off x="591021" y="1486920"/>
+                  <a:ext cx="2837979" cy="945993"/>
+                </a:xfrm>
+                <a:prstGeom prst="rect">
+                  <a:avLst/>
+                </a:prstGeom>
+                <a:ln>
+                  <a:solidFill>
+                    <a:schemeClr val="tx1"/>
+                  </a:solidFill>
+                </a:ln>
+                <a:effectLst>
+                  <a:outerShdw blurRad="292100" dist="139700" dir="2700000" algn="tl" rotWithShape="0">
+                    <a:srgbClr val="333333">
+                      <a:alpha val="65000"/>
+                    </a:srgbClr>
+                  </a:outerShdw>
+                </a:effectLst>
+              </p:spPr>
+            </p:pic>
+            <p:pic>
+              <p:nvPicPr>
+                <p:cNvPr id="21" name="Graphic 20" descr="Clipboard Partially Checked with solid fill">
+                  <a:extLst>
+                    <a:ext uri="{FF2B5EF4-FFF2-40B4-BE49-F238E27FC236}">
+                      <a16:creationId xmlns:a16="http://schemas.microsoft.com/office/drawing/2014/main" id="{FA4DBB1C-582A-4BAD-B36F-59770E178DE8}"/>
+                    </a:ext>
+                  </a:extLst>
+                </p:cNvPr>
+                <p:cNvPicPr>
+                  <a:picLocks noChangeAspect="1"/>
+                </p:cNvPicPr>
+                <p:nvPr/>
+              </p:nvPicPr>
+              <p:blipFill>
+                <a:blip r:embed="rId5">
+                  <a:extLst>
+                    <a:ext uri="{28A0092B-C50C-407E-A947-70E740481C1C}">
+                      <a14:useLocalDpi xmlns:a14="http://schemas.microsoft.com/office/drawing/2010/main" val="0"/>
+                    </a:ext>
+                    <a:ext uri="{96DAC541-7B7A-43D3-8B79-37D633B846F1}">
+                      <asvg:svgBlip xmlns:asvg="http://schemas.microsoft.com/office/drawing/2016/SVG/main" r:embed="rId6"/>
+                    </a:ext>
+                  </a:extLst>
+                </a:blip>
+                <a:stretch>
+                  <a:fillRect/>
+                </a:stretch>
+              </p:blipFill>
+              <p:spPr>
+                <a:xfrm>
+                  <a:off x="9315767" y="3715235"/>
+                  <a:ext cx="1514475" cy="1514475"/>
+                </a:xfrm>
+                <a:prstGeom prst="rect">
+                  <a:avLst/>
+                </a:prstGeom>
+                <a:effectLst>
+                  <a:outerShdw blurRad="292100" dist="139700" dir="2700000" algn="tl" rotWithShape="0">
+                    <a:srgbClr val="333333">
+                      <a:alpha val="65000"/>
+                    </a:srgbClr>
+                  </a:outerShdw>
+                </a:effectLst>
+              </p:spPr>
+            </p:pic>
+          </p:grpSp>
+          <p:sp>
+            <p:nvSpPr>
+              <p:cNvPr id="2" name="TextBox 1">
+                <a:extLst>
+                  <a:ext uri="{FF2B5EF4-FFF2-40B4-BE49-F238E27FC236}">
+                    <a16:creationId xmlns:a16="http://schemas.microsoft.com/office/drawing/2014/main" id="{1D46A293-D635-4C60-AC8C-139EEAF4D100}"/>
+                  </a:ext>
+                </a:extLst>
+              </p:cNvPr>
+              <p:cNvSpPr txBox="1"/>
               <p:nvPr/>
             </p:nvSpPr>
             <p:spPr>
               <a:xfrm>
-                <a:off x="924560" y="2367280"/>
-                <a:ext cx="1751965" cy="934720"/>
+                <a:off x="2779315" y="765100"/>
+                <a:ext cx="5643724" cy="461665"/>
               </a:xfrm>
-              <a:prstGeom prst="roundRect">
+              <a:prstGeom prst="rect">
                 <a:avLst/>
               </a:prstGeom>
-              <a:solidFill>
-                <a:schemeClr val="accent6"/>
-              </a:solidFill>
+              <a:noFill/>
             </p:spPr>
-            <p:style>
-              <a:lnRef idx="2">
-                <a:schemeClr val="accent1">
-                  <a:shade val="50000"/>
-                </a:schemeClr>
-              </a:lnRef>
-              <a:fillRef idx="1">
-                <a:schemeClr val="accent1"/>
-              </a:fillRef>
-              <a:effectRef idx="0">
-                <a:schemeClr val="accent1"/>
-              </a:effectRef>
-              <a:fontRef idx="minor">
-                <a:schemeClr val="lt1"/>
-              </a:fontRef>
-            </p:style>
             <p:txBody>
-              <a:bodyPr rtlCol="0" anchor="ctr"/>
+              <a:bodyPr wrap="none" rtlCol="0">
+                <a:spAutoFit/>
+              </a:bodyPr>
               <a:lstStyle/>
               <a:p>
-                <a:pPr algn="ctr"/>
                 <a:r>
-                  <a:rPr lang="en-US" dirty="0"/>
-                  <a:t>Explain</a:t>
+                  <a:rPr lang="en-US" sz="2400" b="1" dirty="0"/>
+                  <a:t>The “EDGE” acronym for teaching/learning</a:t>
                 </a:r>
               </a:p>
             </p:txBody>
           </p:sp>
-          <p:sp>
-            <p:nvSpPr>
-              <p:cNvPr id="5" name="Rectangle: Rounded Corners 4">
-                <a:extLst>
-                  <a:ext uri="{FF2B5EF4-FFF2-40B4-BE49-F238E27FC236}">
-                    <a16:creationId xmlns:a16="http://schemas.microsoft.com/office/drawing/2014/main" id="{6AFB17C0-1F78-4254-93EC-31A9DB3CA2E6}"/>
-                  </a:ext>
-                </a:extLst>
-              </p:cNvPr>
-              <p:cNvSpPr/>
-              <p:nvPr/>
-            </p:nvSpPr>
-            <p:spPr>
-              <a:xfrm>
-                <a:off x="3429635" y="2367280"/>
-                <a:ext cx="1751965" cy="934720"/>
-              </a:xfrm>
-              <a:prstGeom prst="roundRect">
-                <a:avLst/>
-              </a:prstGeom>
-              <a:solidFill>
-                <a:schemeClr val="accent2"/>
-              </a:solidFill>
-            </p:spPr>
-            <p:style>
-              <a:lnRef idx="2">
-                <a:schemeClr val="accent1">
-                  <a:shade val="50000"/>
-                </a:schemeClr>
-              </a:lnRef>
-              <a:fillRef idx="1">
-                <a:schemeClr val="accent1"/>
-              </a:fillRef>
-              <a:effectRef idx="0">
-                <a:schemeClr val="accent1"/>
-              </a:effectRef>
-              <a:fontRef idx="minor">
-                <a:schemeClr val="lt1"/>
-              </a:fontRef>
-            </p:style>
-            <p:txBody>
-              <a:bodyPr rtlCol="0" anchor="ctr"/>
-              <a:lstStyle/>
-              <a:p>
-                <a:pPr algn="ctr"/>
-                <a:r>
-                  <a:rPr lang="en-US" dirty="0"/>
-                  <a:t>Demonstrate</a:t>
-                </a:r>
-              </a:p>
-            </p:txBody>
-          </p:sp>
-          <p:sp>
-            <p:nvSpPr>
-              <p:cNvPr id="6" name="Rectangle: Rounded Corners 5">
-                <a:extLst>
-                  <a:ext uri="{FF2B5EF4-FFF2-40B4-BE49-F238E27FC236}">
-                    <a16:creationId xmlns:a16="http://schemas.microsoft.com/office/drawing/2014/main" id="{DEABF215-C694-42D8-B2C2-E9AB732883B8}"/>
-                  </a:ext>
-                </a:extLst>
-              </p:cNvPr>
-              <p:cNvSpPr/>
-              <p:nvPr/>
-            </p:nvSpPr>
-            <p:spPr>
-              <a:xfrm>
-                <a:off x="6134419" y="2367280"/>
-                <a:ext cx="1751965" cy="934720"/>
-              </a:xfrm>
-              <a:prstGeom prst="roundRect">
-                <a:avLst/>
-              </a:prstGeom>
-              <a:solidFill>
-                <a:srgbClr val="00B0F0"/>
-              </a:solidFill>
-            </p:spPr>
-            <p:style>
-              <a:lnRef idx="2">
-                <a:schemeClr val="accent1">
-                  <a:shade val="50000"/>
-                </a:schemeClr>
-              </a:lnRef>
-              <a:fillRef idx="1">
-                <a:schemeClr val="accent1"/>
-              </a:fillRef>
-              <a:effectRef idx="0">
-                <a:schemeClr val="accent1"/>
-              </a:effectRef>
-              <a:fontRef idx="minor">
-                <a:schemeClr val="lt1"/>
-              </a:fontRef>
-            </p:style>
-            <p:txBody>
-              <a:bodyPr rtlCol="0" anchor="ctr"/>
-              <a:lstStyle/>
-              <a:p>
-                <a:pPr algn="ctr"/>
-                <a:r>
-                  <a:rPr lang="en-US" dirty="0"/>
-                  <a:t>Guide</a:t>
-                </a:r>
-              </a:p>
-            </p:txBody>
-          </p:sp>
-          <p:sp>
-            <p:nvSpPr>
-              <p:cNvPr id="7" name="Rectangle: Rounded Corners 6">
-                <a:extLst>
-                  <a:ext uri="{FF2B5EF4-FFF2-40B4-BE49-F238E27FC236}">
-                    <a16:creationId xmlns:a16="http://schemas.microsoft.com/office/drawing/2014/main" id="{4D9AB747-04E9-4577-88C4-25036C4D7660}"/>
-                  </a:ext>
-                </a:extLst>
-              </p:cNvPr>
-              <p:cNvSpPr/>
-              <p:nvPr/>
-            </p:nvSpPr>
-            <p:spPr>
-              <a:xfrm>
-                <a:off x="8925560" y="2367280"/>
-                <a:ext cx="1751965" cy="934720"/>
-              </a:xfrm>
-              <a:prstGeom prst="roundRect">
-                <a:avLst/>
-              </a:prstGeom>
-            </p:spPr>
-            <p:style>
-              <a:lnRef idx="2">
-                <a:schemeClr val="accent1">
-                  <a:shade val="50000"/>
-                </a:schemeClr>
-              </a:lnRef>
-              <a:fillRef idx="1">
-                <a:schemeClr val="accent1"/>
-              </a:fillRef>
-              <a:effectRef idx="0">
-                <a:schemeClr val="accent1"/>
-              </a:effectRef>
-              <a:fontRef idx="minor">
-                <a:schemeClr val="lt1"/>
-              </a:fontRef>
-            </p:style>
-            <p:txBody>
-              <a:bodyPr rtlCol="0" anchor="ctr"/>
-              <a:lstStyle/>
-              <a:p>
-                <a:pPr algn="ctr"/>
-                <a:r>
-                  <a:rPr lang="en-US" dirty="0"/>
-                  <a:t>Evaluate</a:t>
-                </a:r>
-              </a:p>
-            </p:txBody>
-          </p:sp>
-          <p:sp>
-            <p:nvSpPr>
-              <p:cNvPr id="8" name="Arrow: Right 7">
-                <a:extLst>
-                  <a:ext uri="{FF2B5EF4-FFF2-40B4-BE49-F238E27FC236}">
-                    <a16:creationId xmlns:a16="http://schemas.microsoft.com/office/drawing/2014/main" id="{D6528606-6C1C-4247-B1C4-8963009ECFF9}"/>
-                  </a:ext>
-                </a:extLst>
-              </p:cNvPr>
-              <p:cNvSpPr/>
-              <p:nvPr/>
-            </p:nvSpPr>
-            <p:spPr>
-              <a:xfrm>
-                <a:off x="2876550" y="2705100"/>
-                <a:ext cx="381000" cy="314325"/>
-              </a:xfrm>
-              <a:prstGeom prst="rightArrow">
-                <a:avLst/>
-              </a:prstGeom>
-              <a:solidFill>
-                <a:schemeClr val="tx1"/>
-              </a:solidFill>
-            </p:spPr>
-            <p:style>
-              <a:lnRef idx="2">
-                <a:schemeClr val="accent1">
-                  <a:shade val="50000"/>
-                </a:schemeClr>
-              </a:lnRef>
-              <a:fillRef idx="1">
-                <a:schemeClr val="accent1"/>
-              </a:fillRef>
-              <a:effectRef idx="0">
-                <a:schemeClr val="accent1"/>
-              </a:effectRef>
-              <a:fontRef idx="minor">
-                <a:schemeClr val="lt1"/>
-              </a:fontRef>
-            </p:style>
-            <p:txBody>
-              <a:bodyPr rtlCol="0" anchor="ctr"/>
-              <a:lstStyle/>
-              <a:p>
-                <a:pPr algn="ctr"/>
-                <a:endParaRPr lang="en-US"/>
-              </a:p>
-            </p:txBody>
-          </p:sp>
-          <p:sp>
-            <p:nvSpPr>
-              <p:cNvPr id="9" name="Arrow: Right 8">
-                <a:extLst>
-                  <a:ext uri="{FF2B5EF4-FFF2-40B4-BE49-F238E27FC236}">
-                    <a16:creationId xmlns:a16="http://schemas.microsoft.com/office/drawing/2014/main" id="{FD19A871-AF91-4802-940D-7607D1BBD111}"/>
-                  </a:ext>
-                </a:extLst>
-              </p:cNvPr>
-              <p:cNvSpPr/>
-              <p:nvPr/>
-            </p:nvSpPr>
-            <p:spPr>
-              <a:xfrm>
-                <a:off x="5429727" y="2677477"/>
-                <a:ext cx="381000" cy="314325"/>
-              </a:xfrm>
-              <a:prstGeom prst="rightArrow">
-                <a:avLst/>
-              </a:prstGeom>
-              <a:solidFill>
-                <a:schemeClr val="tx1"/>
-              </a:solidFill>
-            </p:spPr>
-            <p:style>
-              <a:lnRef idx="2">
-                <a:schemeClr val="accent1">
-                  <a:shade val="50000"/>
-                </a:schemeClr>
-              </a:lnRef>
-              <a:fillRef idx="1">
-                <a:schemeClr val="accent1"/>
-              </a:fillRef>
-              <a:effectRef idx="0">
-                <a:schemeClr val="accent1"/>
-              </a:effectRef>
-              <a:fontRef idx="minor">
-                <a:schemeClr val="lt1"/>
-              </a:fontRef>
-            </p:style>
-            <p:txBody>
-              <a:bodyPr rtlCol="0" anchor="ctr"/>
-              <a:lstStyle/>
-              <a:p>
-                <a:pPr algn="ctr"/>
-                <a:endParaRPr lang="en-US"/>
-              </a:p>
-            </p:txBody>
-          </p:sp>
-          <p:sp>
-            <p:nvSpPr>
-              <p:cNvPr id="10" name="Arrow: Right 9">
-                <a:extLst>
-                  <a:ext uri="{FF2B5EF4-FFF2-40B4-BE49-F238E27FC236}">
-                    <a16:creationId xmlns:a16="http://schemas.microsoft.com/office/drawing/2014/main" id="{17E43123-59C0-41BB-B908-03A2351DF7FE}"/>
-                  </a:ext>
-                </a:extLst>
-              </p:cNvPr>
-              <p:cNvSpPr/>
-              <p:nvPr/>
-            </p:nvSpPr>
-            <p:spPr>
-              <a:xfrm>
-                <a:off x="8210076" y="2677476"/>
-                <a:ext cx="381000" cy="314325"/>
-              </a:xfrm>
-              <a:prstGeom prst="rightArrow">
-                <a:avLst/>
-              </a:prstGeom>
-              <a:solidFill>
-                <a:schemeClr val="tx1"/>
-              </a:solidFill>
-            </p:spPr>
-            <p:style>
-              <a:lnRef idx="2">
-                <a:schemeClr val="accent1">
-                  <a:shade val="50000"/>
-                </a:schemeClr>
-              </a:lnRef>
-              <a:fillRef idx="1">
-                <a:schemeClr val="accent1"/>
-              </a:fillRef>
-              <a:effectRef idx="0">
-                <a:schemeClr val="accent1"/>
-              </a:effectRef>
-              <a:fontRef idx="minor">
-                <a:schemeClr val="lt1"/>
-              </a:fontRef>
-            </p:style>
-            <p:txBody>
-              <a:bodyPr rtlCol="0" anchor="ctr"/>
-              <a:lstStyle/>
-              <a:p>
-                <a:pPr algn="ctr"/>
-                <a:endParaRPr lang="en-US"/>
-              </a:p>
-            </p:txBody>
-          </p:sp>
         </p:grpSp>
-        <p:pic>
-          <p:nvPicPr>
-            <p:cNvPr id="14" name="Picture 13" descr="Teacher pointing at laptop screen to young students">
+        <p:sp>
+          <p:nvSpPr>
+            <p:cNvPr id="11" name="Rectangle: Rounded Corners 10">
               <a:extLst>
                 <a:ext uri="{FF2B5EF4-FFF2-40B4-BE49-F238E27FC236}">
-                  <a16:creationId xmlns:a16="http://schemas.microsoft.com/office/drawing/2014/main" id="{F9902EE4-E924-4C83-B663-5B19A6466995}"/>
+                  <a16:creationId xmlns:a16="http://schemas.microsoft.com/office/drawing/2014/main" id="{EAEE53C9-8241-4812-A384-118B1EE155FC}"/>
                 </a:ext>
               </a:extLst>
             </p:cNvPr>
-            <p:cNvPicPr>
-              <a:picLocks noChangeAspect="1"/>
-            </p:cNvPicPr>
+            <p:cNvSpPr/>
             <p:nvPr/>
-          </p:nvPicPr>
-          <p:blipFill>
-            <a:blip r:embed="rId2">
-              <a:extLst>
-                <a:ext uri="{28A0092B-C50C-407E-A947-70E740481C1C}">
-                  <a14:useLocalDpi xmlns:a14="http://schemas.microsoft.com/office/drawing/2010/main" val="0"/>
-                </a:ext>
-              </a:extLst>
-            </a:blip>
-            <a:stretch>
-              <a:fillRect/>
-            </a:stretch>
-          </p:blipFill>
+          </p:nvSpPr>
           <p:spPr>
             <a:xfrm>
-              <a:off x="5982177" y="658237"/>
-              <a:ext cx="2308497" cy="1538623"/>
+              <a:off x="934720" y="2533650"/>
+              <a:ext cx="4589303" cy="1247775"/>
             </a:xfrm>
-            <a:prstGeom prst="rect">
+            <a:prstGeom prst="roundRect">
               <a:avLst/>
             </a:prstGeom>
+            <a:noFill/>
+            <a:ln w="66675">
+              <a:solidFill>
+                <a:srgbClr val="FF0000"/>
+              </a:solidFill>
+            </a:ln>
           </p:spPr>
-        </p:pic>
-        <p:pic>
-          <p:nvPicPr>
-            <p:cNvPr id="17" name="Picture 16" descr="Graphical user interface&#10;&#10;Description automatically generated">
-              <a:extLst>
-                <a:ext uri="{FF2B5EF4-FFF2-40B4-BE49-F238E27FC236}">
-                  <a16:creationId xmlns:a16="http://schemas.microsoft.com/office/drawing/2014/main" id="{49BC7F51-6CF5-4964-9794-E25F46339A1F}"/>
-                </a:ext>
-              </a:extLst>
-            </p:cNvPr>
-            <p:cNvPicPr>
-              <a:picLocks noChangeAspect="1"/>
-            </p:cNvPicPr>
-            <p:nvPr/>
-          </p:nvPicPr>
-          <p:blipFill>
-            <a:blip r:embed="rId3">
-              <a:extLst>
-                <a:ext uri="{28A0092B-C50C-407E-A947-70E740481C1C}">
-                  <a14:useLocalDpi xmlns:a14="http://schemas.microsoft.com/office/drawing/2010/main" val="0"/>
-                </a:ext>
-              </a:extLst>
-            </a:blip>
-            <a:stretch>
-              <a:fillRect/>
-            </a:stretch>
-          </p:blipFill>
-          <p:spPr>
-            <a:xfrm>
-              <a:off x="2688888" y="4479151"/>
-              <a:ext cx="3616981" cy="1751064"/>
-            </a:xfrm>
-            <a:prstGeom prst="rect">
-              <a:avLst/>
-            </a:prstGeom>
-          </p:spPr>
-        </p:pic>
-        <p:pic>
-          <p:nvPicPr>
-            <p:cNvPr id="19" name="Picture 18" descr="A picture containing text&#10;&#10;Description automatically generated">
-              <a:extLst>
-                <a:ext uri="{FF2B5EF4-FFF2-40B4-BE49-F238E27FC236}">
-                  <a16:creationId xmlns:a16="http://schemas.microsoft.com/office/drawing/2014/main" id="{1E7A230C-C80A-4652-8B8E-0235E37F4572}"/>
-                </a:ext>
-              </a:extLst>
-            </p:cNvPr>
-            <p:cNvPicPr>
-              <a:picLocks noChangeAspect="1"/>
-            </p:cNvPicPr>
-            <p:nvPr/>
-          </p:nvPicPr>
-          <p:blipFill>
-            <a:blip r:embed="rId4">
-              <a:extLst>
-                <a:ext uri="{28A0092B-C50C-407E-A947-70E740481C1C}">
-                  <a14:useLocalDpi xmlns:a14="http://schemas.microsoft.com/office/drawing/2010/main" val="0"/>
-                </a:ext>
-              </a:extLst>
-            </a:blip>
-            <a:stretch>
-              <a:fillRect/>
-            </a:stretch>
-          </p:blipFill>
-          <p:spPr>
-            <a:xfrm>
-              <a:off x="553002" y="954551"/>
-              <a:ext cx="2837979" cy="945993"/>
-            </a:xfrm>
-            <a:prstGeom prst="rect">
-              <a:avLst/>
-            </a:prstGeom>
-          </p:spPr>
-        </p:pic>
-        <p:pic>
-          <p:nvPicPr>
-            <p:cNvPr id="21" name="Graphic 20" descr="Clipboard Partially Checked with solid fill">
-              <a:extLst>
-                <a:ext uri="{FF2B5EF4-FFF2-40B4-BE49-F238E27FC236}">
-                  <a16:creationId xmlns:a16="http://schemas.microsoft.com/office/drawing/2014/main" id="{FA4DBB1C-582A-4BAD-B36F-59770E178DE8}"/>
-                </a:ext>
-              </a:extLst>
-            </p:cNvPr>
-            <p:cNvPicPr>
-              <a:picLocks noChangeAspect="1"/>
-            </p:cNvPicPr>
-            <p:nvPr/>
-          </p:nvPicPr>
-          <p:blipFill>
-            <a:blip r:embed="rId5">
-              <a:extLst>
-                <a:ext uri="{28A0092B-C50C-407E-A947-70E740481C1C}">
-                  <a14:useLocalDpi xmlns:a14="http://schemas.microsoft.com/office/drawing/2010/main" val="0"/>
-                </a:ext>
-                <a:ext uri="{96DAC541-7B7A-43D3-8B79-37D633B846F1}">
-                  <asvg:svgBlip xmlns:asvg="http://schemas.microsoft.com/office/drawing/2016/SVG/main" r:embed="rId6"/>
-                </a:ext>
-              </a:extLst>
-            </a:blip>
-            <a:stretch>
-              <a:fillRect/>
-            </a:stretch>
-          </p:blipFill>
-          <p:spPr>
-            <a:xfrm>
-              <a:off x="9215754" y="4597445"/>
-              <a:ext cx="1514475" cy="1514475"/>
-            </a:xfrm>
-            <a:prstGeom prst="rect">
-              <a:avLst/>
-            </a:prstGeom>
-          </p:spPr>
-        </p:pic>
+          <p:style>
+            <a:lnRef idx="2">
+              <a:schemeClr val="accent1">
+                <a:shade val="50000"/>
+              </a:schemeClr>
+            </a:lnRef>
+            <a:fillRef idx="1">
+              <a:schemeClr val="accent1"/>
+            </a:fillRef>
+            <a:effectRef idx="0">
+              <a:schemeClr val="accent1"/>
+            </a:effectRef>
+            <a:fontRef idx="minor">
+              <a:schemeClr val="lt1"/>
+            </a:fontRef>
+          </p:style>
+          <p:txBody>
+            <a:bodyPr rtlCol="0" anchor="ctr"/>
+            <a:lstStyle/>
+            <a:p>
+              <a:pPr algn="ctr"/>
+              <a:endParaRPr lang="en-US"/>
+            </a:p>
+          </p:txBody>
+        </p:sp>
       </p:grpSp>
     </p:spTree>
     <p:extLst>

</xml_diff>